<commit_message>
Reviewed some slides with Vlad.
</commit_message>
<xml_diff>
--- a/Examples for Hoare�s logic laws and theorems.pptx
+++ b/Examples for Hoare�s logic laws and theorems.pptx
@@ -291,6 +291,7 @@
           <a:p>
             <a:fld id="{E6479D56-1F3F-41DC-881B-12D2C9B80BA8}" type="datetimeFigureOut">
               <a:rPr lang="ru-RU" smtClean="0"/>
+              <a:pPr/>
               <a:t>24.07.2011</a:t>
             </a:fld>
             <a:endParaRPr lang="ru-RU"/>
@@ -333,6 +334,7 @@
           <a:p>
             <a:fld id="{64B99FC0-EE24-4B41-AC00-D056D41B110F}" type="slidenum">
               <a:rPr lang="ru-RU" smtClean="0"/>
+              <a:pPr/>
               <a:t>‹#›</a:t>
             </a:fld>
             <a:endParaRPr lang="ru-RU"/>
@@ -456,6 +458,7 @@
           <a:p>
             <a:fld id="{E6479D56-1F3F-41DC-881B-12D2C9B80BA8}" type="datetimeFigureOut">
               <a:rPr lang="ru-RU" smtClean="0"/>
+              <a:pPr/>
               <a:t>24.07.2011</a:t>
             </a:fld>
             <a:endParaRPr lang="ru-RU"/>
@@ -498,6 +501,7 @@
           <a:p>
             <a:fld id="{64B99FC0-EE24-4B41-AC00-D056D41B110F}" type="slidenum">
               <a:rPr lang="ru-RU" smtClean="0"/>
+              <a:pPr/>
               <a:t>‹#›</a:t>
             </a:fld>
             <a:endParaRPr lang="ru-RU"/>
@@ -631,6 +635,7 @@
           <a:p>
             <a:fld id="{E6479D56-1F3F-41DC-881B-12D2C9B80BA8}" type="datetimeFigureOut">
               <a:rPr lang="ru-RU" smtClean="0"/>
+              <a:pPr/>
               <a:t>24.07.2011</a:t>
             </a:fld>
             <a:endParaRPr lang="ru-RU"/>
@@ -673,6 +678,7 @@
           <a:p>
             <a:fld id="{64B99FC0-EE24-4B41-AC00-D056D41B110F}" type="slidenum">
               <a:rPr lang="ru-RU" smtClean="0"/>
+              <a:pPr/>
               <a:t>‹#›</a:t>
             </a:fld>
             <a:endParaRPr lang="ru-RU"/>
@@ -796,6 +802,7 @@
           <a:p>
             <a:fld id="{E6479D56-1F3F-41DC-881B-12D2C9B80BA8}" type="datetimeFigureOut">
               <a:rPr lang="ru-RU" smtClean="0"/>
+              <a:pPr/>
               <a:t>24.07.2011</a:t>
             </a:fld>
             <a:endParaRPr lang="ru-RU"/>
@@ -838,6 +845,7 @@
           <a:p>
             <a:fld id="{64B99FC0-EE24-4B41-AC00-D056D41B110F}" type="slidenum">
               <a:rPr lang="ru-RU" smtClean="0"/>
+              <a:pPr/>
               <a:t>‹#›</a:t>
             </a:fld>
             <a:endParaRPr lang="ru-RU"/>
@@ -1037,6 +1045,7 @@
           <a:p>
             <a:fld id="{E6479D56-1F3F-41DC-881B-12D2C9B80BA8}" type="datetimeFigureOut">
               <a:rPr lang="ru-RU" smtClean="0"/>
+              <a:pPr/>
               <a:t>24.07.2011</a:t>
             </a:fld>
             <a:endParaRPr lang="ru-RU"/>
@@ -1079,6 +1088,7 @@
           <a:p>
             <a:fld id="{64B99FC0-EE24-4B41-AC00-D056D41B110F}" type="slidenum">
               <a:rPr lang="ru-RU" smtClean="0"/>
+              <a:pPr/>
               <a:t>‹#›</a:t>
             </a:fld>
             <a:endParaRPr lang="ru-RU"/>
@@ -1320,6 +1330,7 @@
           <a:p>
             <a:fld id="{E6479D56-1F3F-41DC-881B-12D2C9B80BA8}" type="datetimeFigureOut">
               <a:rPr lang="ru-RU" smtClean="0"/>
+              <a:pPr/>
               <a:t>24.07.2011</a:t>
             </a:fld>
             <a:endParaRPr lang="ru-RU"/>
@@ -1362,6 +1373,7 @@
           <a:p>
             <a:fld id="{64B99FC0-EE24-4B41-AC00-D056D41B110F}" type="slidenum">
               <a:rPr lang="ru-RU" smtClean="0"/>
+              <a:pPr/>
               <a:t>‹#›</a:t>
             </a:fld>
             <a:endParaRPr lang="ru-RU"/>
@@ -1737,6 +1749,7 @@
           <a:p>
             <a:fld id="{E6479D56-1F3F-41DC-881B-12D2C9B80BA8}" type="datetimeFigureOut">
               <a:rPr lang="ru-RU" smtClean="0"/>
+              <a:pPr/>
               <a:t>24.07.2011</a:t>
             </a:fld>
             <a:endParaRPr lang="ru-RU"/>
@@ -1779,6 +1792,7 @@
           <a:p>
             <a:fld id="{64B99FC0-EE24-4B41-AC00-D056D41B110F}" type="slidenum">
               <a:rPr lang="ru-RU" smtClean="0"/>
+              <a:pPr/>
               <a:t>‹#›</a:t>
             </a:fld>
             <a:endParaRPr lang="ru-RU"/>
@@ -1850,6 +1864,7 @@
           <a:p>
             <a:fld id="{E6479D56-1F3F-41DC-881B-12D2C9B80BA8}" type="datetimeFigureOut">
               <a:rPr lang="ru-RU" smtClean="0"/>
+              <a:pPr/>
               <a:t>24.07.2011</a:t>
             </a:fld>
             <a:endParaRPr lang="ru-RU"/>
@@ -1892,6 +1907,7 @@
           <a:p>
             <a:fld id="{64B99FC0-EE24-4B41-AC00-D056D41B110F}" type="slidenum">
               <a:rPr lang="ru-RU" smtClean="0"/>
+              <a:pPr/>
               <a:t>‹#›</a:t>
             </a:fld>
             <a:endParaRPr lang="ru-RU"/>
@@ -1940,6 +1956,7 @@
           <a:p>
             <a:fld id="{E6479D56-1F3F-41DC-881B-12D2C9B80BA8}" type="datetimeFigureOut">
               <a:rPr lang="ru-RU" smtClean="0"/>
+              <a:pPr/>
               <a:t>24.07.2011</a:t>
             </a:fld>
             <a:endParaRPr lang="ru-RU"/>
@@ -1982,6 +1999,7 @@
           <a:p>
             <a:fld id="{64B99FC0-EE24-4B41-AC00-D056D41B110F}" type="slidenum">
               <a:rPr lang="ru-RU" smtClean="0"/>
+              <a:pPr/>
               <a:t>‹#›</a:t>
             </a:fld>
             <a:endParaRPr lang="ru-RU"/>
@@ -2212,6 +2230,7 @@
           <a:p>
             <a:fld id="{E6479D56-1F3F-41DC-881B-12D2C9B80BA8}" type="datetimeFigureOut">
               <a:rPr lang="ru-RU" smtClean="0"/>
+              <a:pPr/>
               <a:t>24.07.2011</a:t>
             </a:fld>
             <a:endParaRPr lang="ru-RU"/>
@@ -2254,6 +2273,7 @@
           <a:p>
             <a:fld id="{64B99FC0-EE24-4B41-AC00-D056D41B110F}" type="slidenum">
               <a:rPr lang="ru-RU" smtClean="0"/>
+              <a:pPr/>
               <a:t>‹#›</a:t>
             </a:fld>
             <a:endParaRPr lang="ru-RU"/>
@@ -2460,6 +2480,7 @@
           <a:p>
             <a:fld id="{E6479D56-1F3F-41DC-881B-12D2C9B80BA8}" type="datetimeFigureOut">
               <a:rPr lang="ru-RU" smtClean="0"/>
+              <a:pPr/>
               <a:t>24.07.2011</a:t>
             </a:fld>
             <a:endParaRPr lang="ru-RU"/>
@@ -2502,6 +2523,7 @@
           <a:p>
             <a:fld id="{64B99FC0-EE24-4B41-AC00-D056D41B110F}" type="slidenum">
               <a:rPr lang="ru-RU" smtClean="0"/>
+              <a:pPr/>
               <a:t>‹#›</a:t>
             </a:fld>
             <a:endParaRPr lang="ru-RU"/>
@@ -2668,6 +2690,7 @@
           <a:p>
             <a:fld id="{E6479D56-1F3F-41DC-881B-12D2C9B80BA8}" type="datetimeFigureOut">
               <a:rPr lang="ru-RU" smtClean="0"/>
+              <a:pPr/>
               <a:t>24.07.2011</a:t>
             </a:fld>
             <a:endParaRPr lang="ru-RU"/>
@@ -2746,6 +2769,7 @@
           <a:p>
             <a:fld id="{64B99FC0-EE24-4B41-AC00-D056D41B110F}" type="slidenum">
               <a:rPr lang="ru-RU" smtClean="0"/>
+              <a:pPr/>
               <a:t>‹#›</a:t>
             </a:fld>
             <a:endParaRPr lang="ru-RU"/>
@@ -3160,7 +3184,7 @@
         <p:spPr/>
         <p:txBody>
           <a:bodyPr>
-            <a:normAutofit lnSpcReduction="10000"/>
+            <a:normAutofit/>
           </a:bodyPr>
           <a:lstStyle/>
           <a:p>
@@ -3190,14 +3214,7 @@
                 <a:cs typeface="Lucida Sans Unicode" pitchFamily="34" charset="0"/>
                 <a:sym typeface="Symbol"/>
               </a:rPr>
-              <a:t>Theorem: </a:t>
-            </a:r>
-            <a:r>
-              <a:rPr lang="en-US" dirty="0" smtClean="0">
-                <a:cs typeface="Lucida Sans Unicode" pitchFamily="34" charset="0"/>
-                <a:sym typeface="Symbol"/>
-              </a:rPr>
-              <a:t>{p}  {q}</a:t>
+              <a:t>Theorem: {p}  {q}</a:t>
             </a:r>
           </a:p>
           <a:p>
@@ -3210,14 +3227,7 @@
                 <a:cs typeface="Lucida Sans Unicode" pitchFamily="34" charset="0"/>
                 <a:sym typeface="Symbol"/>
               </a:rPr>
-              <a:t>In particular {p} </a:t>
-            </a:r>
-            <a:r>
-              <a:rPr lang="en-US" dirty="0" smtClean="0">
-                <a:cs typeface="Lucida Sans Unicode" pitchFamily="34" charset="0"/>
-                <a:sym typeface="Symbol"/>
-              </a:rPr>
-              <a:t> {false}</a:t>
+              <a:t>In particular {p}  {false}</a:t>
             </a:r>
           </a:p>
           <a:p>
@@ -3243,44 +3253,48 @@
                 <a:cs typeface="Lucida Sans Unicode" pitchFamily="34" charset="0"/>
                 <a:sym typeface="Symbol"/>
               </a:rPr>
-              <a:t>Use cases:</a:t>
-            </a:r>
-          </a:p>
-          <a:p>
-            <a:pPr marL="742950" lvl="2" indent="-342900"/>
+              <a:t>Illustrations</a:t>
+            </a:r>
             <a:r>
               <a:rPr lang="en-US" dirty="0" smtClean="0">
                 <a:cs typeface="Lucida Sans Unicode" pitchFamily="34" charset="0"/>
                 <a:sym typeface="Symbol"/>
               </a:rPr>
-              <a:t>Partial (incomplete) programs</a:t>
-            </a:r>
-          </a:p>
-          <a:p>
-            <a:pPr marL="1200150" lvl="3" indent="-342900"/>
+              <a:t>:</a:t>
+            </a:r>
+            <a:endParaRPr lang="en-US" dirty="0" smtClean="0">
+              <a:cs typeface="Lucida Sans Unicode" pitchFamily="34" charset="0"/>
+              <a:sym typeface="Symbol"/>
+            </a:endParaRPr>
+          </a:p>
+          <a:p>
+            <a:pPr marL="742950" lvl="2" indent="-342900"/>
             <a:r>
               <a:rPr lang="en-US" dirty="0" smtClean="0">
                 <a:cs typeface="Lucida Sans Unicode" pitchFamily="34" charset="0"/>
                 <a:sym typeface="Symbol"/>
               </a:rPr>
-              <a:t>Some parts are not even implemented</a:t>
-            </a:r>
-          </a:p>
-          <a:p>
-            <a:pPr marL="742950" lvl="2" indent="-342900"/>
+              <a:t>Partial (incomplete) programs</a:t>
+            </a:r>
+          </a:p>
+          <a:p>
+            <a:pPr marL="1200150" lvl="3" indent="-342900"/>
             <a:r>
               <a:rPr lang="en-US" dirty="0" smtClean="0">
                 <a:cs typeface="Lucida Sans Unicode" pitchFamily="34" charset="0"/>
                 <a:sym typeface="Symbol"/>
               </a:rPr>
-              <a:t>“almost correct” programs (</a:t>
-            </a:r>
+              <a:t>Some parts are not even implemented</a:t>
+            </a:r>
+          </a:p>
+          <a:p>
+            <a:pPr marL="742950" lvl="2" indent="-342900"/>
             <a:r>
               <a:rPr lang="en-US" dirty="0" smtClean="0">
                 <a:cs typeface="Lucida Sans Unicode" pitchFamily="34" charset="0"/>
                 <a:sym typeface="Symbol"/>
               </a:rPr>
-              <a:t> is not reachable)</a:t>
+              <a:t>“almost correct” programs ( is not reachable)</a:t>
             </a:r>
           </a:p>
           <a:p>
@@ -3290,24 +3304,14 @@
                 <a:cs typeface="Lucida Sans Unicode" pitchFamily="34" charset="0"/>
                 <a:sym typeface="Symbol"/>
               </a:rPr>
-              <a:t> cannot be reached in observable time</a:t>
-            </a:r>
-          </a:p>
-          <a:p>
-            <a:pPr marL="1200150" lvl="3" indent="-342900"/>
+              <a:t>System </a:t>
+            </a:r>
             <a:r>
               <a:rPr lang="en-US" dirty="0" smtClean="0">
                 <a:cs typeface="Lucida Sans Unicode" pitchFamily="34" charset="0"/>
                 <a:sym typeface="Symbol"/>
               </a:rPr>
-              <a:t>System does not allow to reach </a:t>
-            </a:r>
-            <a:r>
-              <a:rPr lang="en-US" dirty="0" smtClean="0">
-                <a:cs typeface="Lucida Sans Unicode" pitchFamily="34" charset="0"/>
-                <a:sym typeface="Symbol"/>
-              </a:rPr>
-              <a:t></a:t>
+              <a:t>does not allow to reach </a:t>
             </a:r>
             <a:endParaRPr lang="ru-RU" dirty="0"/>
           </a:p>
@@ -3534,14 +3538,7 @@
                 <a:latin typeface="Lucida Console" pitchFamily="49" charset="0"/>
                 <a:cs typeface="Lucida Sans Unicode" pitchFamily="34" charset="0"/>
               </a:rPr>
-              <a:t>   y = f (</a:t>
-            </a:r>
-            <a:r>
-              <a:rPr lang="en-US" sz="2000" dirty="0" smtClean="0">
-                <a:latin typeface="Lucida Console" pitchFamily="49" charset="0"/>
-                <a:cs typeface="Lucida Sans Unicode" pitchFamily="34" charset="0"/>
-              </a:rPr>
-              <a:t>…); if (y &gt;= 0) g (y);</a:t>
+              <a:t>   y = f (…); if (y &gt;= 0) g (y);</a:t>
             </a:r>
           </a:p>
           <a:p>
@@ -3886,7 +3883,7 @@
         </p:nvSpPr>
         <p:spPr>
           <a:xfrm>
-            <a:off x="3131840" y="5301208"/>
+            <a:off x="2987824" y="5301208"/>
             <a:ext cx="2520280" cy="792088"/>
           </a:xfrm>
           <a:prstGeom prst="roundRect">
@@ -3942,8 +3939,8 @@
         </p:nvCxnSpPr>
         <p:spPr>
           <a:xfrm rot="16200000" flipV="1">
-            <a:off x="2843808" y="3753036"/>
-            <a:ext cx="864096" cy="2232248"/>
+            <a:off x="2771800" y="3825044"/>
+            <a:ext cx="864096" cy="2088232"/>
           </a:xfrm>
           <a:prstGeom prst="straightConnector1">
             <a:avLst/>
@@ -3981,8 +3978,8 @@
         </p:nvCxnSpPr>
         <p:spPr>
           <a:xfrm rot="5400000" flipH="1" flipV="1">
-            <a:off x="4986046" y="3843046"/>
-            <a:ext cx="864096" cy="2052228"/>
+            <a:off x="4914038" y="3771038"/>
+            <a:ext cx="864096" cy="2196244"/>
           </a:xfrm>
           <a:prstGeom prst="straightConnector1">
             <a:avLst/>

</xml_diff>